<commit_message>
phase2-add ShoppingCart and Searchbar
</commit_message>
<xml_diff>
--- a/book-store-design.pptx
+++ b/book-store-design.pptx
@@ -358,7 +358,7 @@
           <a:p>
             <a:fld id="{ED291B17-9318-49DB-B28B-6E5994AE9581}" type="datetime1">
               <a:rPr lang="en-US" smtClean="0"/>
-              <a:t>8/11/2021</a:t>
+              <a:t>8/12/2021</a:t>
             </a:fld>
             <a:endParaRPr lang="en-US" dirty="0"/>
           </a:p>
@@ -561,7 +561,7 @@
           <a:p>
             <a:fld id="{2CED4963-E985-44C4-B8C4-FDD613B7C2F8}" type="datetime1">
               <a:rPr lang="en-US" smtClean="0"/>
-              <a:t>8/11/2021</a:t>
+              <a:t>8/12/2021</a:t>
             </a:fld>
             <a:endParaRPr lang="en-US" dirty="0"/>
           </a:p>
@@ -923,7 +923,7 @@
           <a:p>
             <a:fld id="{ED291B17-9318-49DB-B28B-6E5994AE9581}" type="datetime1">
               <a:rPr lang="en-US" smtClean="0"/>
-              <a:t>8/11/2021</a:t>
+              <a:t>8/12/2021</a:t>
             </a:fld>
             <a:endParaRPr lang="en-US" dirty="0"/>
           </a:p>
@@ -1121,7 +1121,7 @@
           <a:p>
             <a:fld id="{78DD82B9-B8EE-4375-B6FF-88FA6ABB15D9}" type="datetime1">
               <a:rPr lang="en-US" smtClean="0"/>
-              <a:t>8/11/2021</a:t>
+              <a:t>8/12/2021</a:t>
             </a:fld>
             <a:endParaRPr lang="en-US" dirty="0"/>
           </a:p>
@@ -1433,7 +1433,7 @@
           <a:p>
             <a:fld id="{B2497495-0637-405E-AE64-5CC7506D51F5}" type="datetime1">
               <a:rPr lang="en-US" smtClean="0"/>
-              <a:t>8/11/2021</a:t>
+              <a:t>8/12/2021</a:t>
             </a:fld>
             <a:endParaRPr lang="en-US" dirty="0"/>
           </a:p>
@@ -1686,7 +1686,7 @@
           <a:p>
             <a:fld id="{7BFFD690-9426-415D-8B65-26881E07B2D4}" type="datetime1">
               <a:rPr lang="en-US" smtClean="0"/>
-              <a:t>8/11/2021</a:t>
+              <a:t>8/12/2021</a:t>
             </a:fld>
             <a:endParaRPr lang="en-US" dirty="0"/>
           </a:p>
@@ -2108,7 +2108,7 @@
           <a:p>
             <a:fld id="{04C4989A-474C-40DE-95B9-011C28B71673}" type="datetime1">
               <a:rPr lang="en-US" smtClean="0"/>
-              <a:t>8/11/2021</a:t>
+              <a:t>8/12/2021</a:t>
             </a:fld>
             <a:endParaRPr lang="en-US" dirty="0"/>
           </a:p>
@@ -2231,7 +2231,7 @@
           <a:p>
             <a:fld id="{5DB4ED54-5B5E-4A04-93D3-5772E3CE3818}" type="datetime1">
               <a:rPr lang="en-US" smtClean="0"/>
-              <a:t>8/11/2021</a:t>
+              <a:t>8/12/2021</a:t>
             </a:fld>
             <a:endParaRPr lang="en-US" dirty="0"/>
           </a:p>
@@ -2326,7 +2326,7 @@
           <a:p>
             <a:fld id="{4EDE50D6-574B-40AF-946F-D52A04ADE379}" type="datetime1">
               <a:rPr lang="en-US" smtClean="0"/>
-              <a:t>8/11/2021</a:t>
+              <a:t>8/12/2021</a:t>
             </a:fld>
             <a:endParaRPr lang="en-US" dirty="0"/>
           </a:p>
@@ -2703,7 +2703,7 @@
           <a:p>
             <a:fld id="{D82884F1-FFEA-405F-9602-3DCA865EDA4E}" type="datetime1">
               <a:rPr lang="en-US" smtClean="0"/>
-              <a:t>8/11/2021</a:t>
+              <a:t>8/12/2021</a:t>
             </a:fld>
             <a:endParaRPr lang="en-US" dirty="0"/>
           </a:p>
@@ -2996,7 +2996,7 @@
           <a:p>
             <a:fld id="{7E18DB4A-8810-4A10-AD5C-D5E2C667F5B3}" type="datetime1">
               <a:rPr lang="en-US" smtClean="0"/>
-              <a:t>8/11/2021</a:t>
+              <a:t>8/12/2021</a:t>
             </a:fld>
             <a:endParaRPr lang="en-US" dirty="0"/>
           </a:p>
@@ -3211,7 +3211,7 @@
           <a:p>
             <a:fld id="{ED291B17-9318-49DB-B28B-6E5994AE9581}" type="datetime1">
               <a:rPr lang="en-US" smtClean="0"/>
-              <a:t>8/11/2021</a:t>
+              <a:t>8/12/2021</a:t>
             </a:fld>
             <a:endParaRPr lang="en-US" dirty="0"/>
           </a:p>
@@ -5553,12 +5553,12 @@
 </file>
 
 <file path=customXml/item1.xml><?xml version="1.0" encoding="utf-8"?>
-<?mso-contentType ?>
-<FormTemplates xmlns="http://schemas.microsoft.com/sharepoint/v3/contenttype/forms">
-  <Display>DocumentLibraryForm</Display>
-  <Edit>DocumentLibraryForm</Edit>
-  <New>DocumentLibraryForm</New>
-</FormTemplates>
+<p:properties xmlns:p="http://schemas.microsoft.com/office/2006/metadata/properties" xmlns:xsi="http://www.w3.org/2001/XMLSchema-instance" xmlns:pc="http://schemas.microsoft.com/office/infopath/2007/PartnerControls">
+  <documentManagement>
+    <Status xmlns="71af3243-3dd4-4a8d-8c0d-dd76da1f02a5">Not started</Status>
+    <MediaServiceKeyPoints xmlns="71af3243-3dd4-4a8d-8c0d-dd76da1f02a5" xsi:nil="true"/>
+  </documentManagement>
+</p:properties>
 </file>
 
 <file path=customXml/item2.xml><?xml version="1.0" encoding="utf-8"?>
@@ -5783,18 +5783,20 @@
 </file>
 
 <file path=customXml/item3.xml><?xml version="1.0" encoding="utf-8"?>
-<p:properties xmlns:p="http://schemas.microsoft.com/office/2006/metadata/properties" xmlns:xsi="http://www.w3.org/2001/XMLSchema-instance" xmlns:pc="http://schemas.microsoft.com/office/infopath/2007/PartnerControls">
-  <documentManagement>
-    <Status xmlns="71af3243-3dd4-4a8d-8c0d-dd76da1f02a5">Not started</Status>
-    <MediaServiceKeyPoints xmlns="71af3243-3dd4-4a8d-8c0d-dd76da1f02a5" xsi:nil="true"/>
-  </documentManagement>
-</p:properties>
+<?mso-contentType ?>
+<FormTemplates xmlns="http://schemas.microsoft.com/sharepoint/v3/contenttype/forms">
+  <Display>DocumentLibraryForm</Display>
+  <Edit>DocumentLibraryForm</Edit>
+  <New>DocumentLibraryForm</New>
+</FormTemplates>
 </file>
 
 <file path=customXml/itemProps1.xml><?xml version="1.0" encoding="utf-8"?>
-<ds:datastoreItem xmlns:ds="http://schemas.openxmlformats.org/officeDocument/2006/customXml" ds:itemID="{927BD4C1-B6B1-4715-ABF9-E660A51A4EA0}">
+<ds:datastoreItem xmlns:ds="http://schemas.openxmlformats.org/officeDocument/2006/customXml" ds:itemID="{8D289AE2-D2AE-49D1-AFAC-3A79F6794255}">
   <ds:schemaRefs>
-    <ds:schemaRef ds:uri="http://schemas.microsoft.com/sharepoint/v3/contenttype/forms"/>
+    <ds:schemaRef ds:uri="http://schemas.microsoft.com/office/2006/metadata/properties"/>
+    <ds:schemaRef ds:uri="http://schemas.microsoft.com/office/infopath/2007/PartnerControls"/>
+    <ds:schemaRef ds:uri="71af3243-3dd4-4a8d-8c0d-dd76da1f02a5"/>
   </ds:schemaRefs>
 </ds:datastoreItem>
 </file>
@@ -5819,11 +5821,9 @@
 </file>
 
 <file path=customXml/itemProps3.xml><?xml version="1.0" encoding="utf-8"?>
-<ds:datastoreItem xmlns:ds="http://schemas.openxmlformats.org/officeDocument/2006/customXml" ds:itemID="{8D289AE2-D2AE-49D1-AFAC-3A79F6794255}">
+<ds:datastoreItem xmlns:ds="http://schemas.openxmlformats.org/officeDocument/2006/customXml" ds:itemID="{927BD4C1-B6B1-4715-ABF9-E660A51A4EA0}">
   <ds:schemaRefs>
-    <ds:schemaRef ds:uri="http://schemas.microsoft.com/office/2006/metadata/properties"/>
-    <ds:schemaRef ds:uri="http://schemas.microsoft.com/office/infopath/2007/PartnerControls"/>
-    <ds:schemaRef ds:uri="71af3243-3dd4-4a8d-8c0d-dd76da1f02a5"/>
+    <ds:schemaRef ds:uri="http://schemas.microsoft.com/sharepoint/v3/contenttype/forms"/>
   </ds:schemaRefs>
 </ds:datastoreItem>
 </file>
</xml_diff>